<commit_message>
Mudança nome do repositorio
</commit_message>
<xml_diff>
--- a/TopologicalSort/Seminario Topological Sort.pptx
+++ b/TopologicalSort/Seminario Topological Sort.pptx
@@ -4630,7 +4630,7 @@
                 <a:spcPct val="100000"/>
               </a:lnSpc>
             </a:pPr>
-            <a:endParaRPr lang="pt-BR" sz="1800" b="0" strike="noStrike" spc="-1">
+            <a:endParaRPr lang="pt-BR" sz="1800" b="0" strike="noStrike" spc="-1" dirty="0">
               <a:solidFill>
                 <a:srgbClr val="000000"/>
               </a:solidFill>
@@ -4649,7 +4649,7 @@
               </a:lnSpc>
             </a:pPr>
             <a:r>
-              <a:rPr lang="pt-BR" sz="3400" b="1" strike="noStrike" spc="-1" dirty="0">
+              <a:rPr lang="pt-BR" sz="3400" b="1" strike="noStrike" spc="-1" dirty="0" smtClean="0">
                 <a:solidFill>
                   <a:srgbClr val="000000"/>
                 </a:solidFill>
@@ -4662,7 +4662,55 @@
                 <a:ea typeface="Arial Narrow"/>
                 <a:hlinkClick r:id="rId2"/>
               </a:rPr>
-              <a:t>github.com/HornlessMoose/P2PHuffman/</a:t>
+              <a:t>github.com/</a:t>
+            </a:r>
+            <a:r>
+              <a:rPr lang="pt-BR" sz="3400" b="1" strike="noStrike" spc="-1" dirty="0" err="1" smtClean="0">
+                <a:solidFill>
+                  <a:srgbClr val="000000"/>
+                </a:solidFill>
+                <a:uFill>
+                  <a:solidFill>
+                    <a:srgbClr val="FFFFFF"/>
+                  </a:solidFill>
+                </a:uFill>
+                <a:latin typeface="Arial Narrow"/>
+                <a:ea typeface="Arial Narrow"/>
+                <a:hlinkClick r:id="rId2"/>
+              </a:rPr>
+              <a:t>HornlessMoose</a:t>
+            </a:r>
+            <a:r>
+              <a:rPr lang="pt-BR" sz="3400" b="1" strike="noStrike" spc="-1" smtClean="0">
+                <a:solidFill>
+                  <a:srgbClr val="000000"/>
+                </a:solidFill>
+                <a:uFill>
+                  <a:solidFill>
+                    <a:srgbClr val="FFFFFF"/>
+                  </a:solidFill>
+                </a:uFill>
+                <a:latin typeface="Arial Narrow"/>
+                <a:ea typeface="Arial Narrow"/>
+                <a:hlinkClick r:id="rId2"/>
+              </a:rPr>
+              <a:t>/Huffman</a:t>
+            </a:r>
+            <a:r>
+              <a:rPr lang="pt-BR" sz="3400" b="1" strike="noStrike" spc="-1" dirty="0">
+                <a:solidFill>
+                  <a:srgbClr val="000000"/>
+                </a:solidFill>
+                <a:uFill>
+                  <a:solidFill>
+                    <a:srgbClr val="FFFFFF"/>
+                  </a:solidFill>
+                </a:uFill>
+                <a:latin typeface="Arial Narrow"/>
+                <a:ea typeface="Arial Narrow"/>
+                <a:hlinkClick r:id="rId2"/>
+              </a:rPr>
+              <a:t>/</a:t>
             </a:r>
             <a:endParaRPr lang="pt-BR" sz="1800" b="0" strike="noStrike" spc="-1" dirty="0">
               <a:solidFill>
@@ -6477,7 +6525,7 @@
           <p:cNvPr id="2" name="Imagem 2">
             <a:extLst>
               <a:ext uri="{FF2B5EF4-FFF2-40B4-BE49-F238E27FC236}">
-                <a16:creationId xmlns:a16="http://schemas.microsoft.com/office/drawing/2014/main" xmlns="" id="{A4597B11-2E36-439A-AAF8-554458330300}"/>
+                <a16:creationId xmlns="" xmlns:a16="http://schemas.microsoft.com/office/drawing/2014/main" id="{A4597B11-2E36-439A-AAF8-554458330300}"/>
               </a:ext>
             </a:extLst>
           </p:cNvPr>
@@ -7045,7 +7093,7 @@
                 <a:gridCol w="5075640">
                   <a:extLst>
                     <a:ext uri="{9D8B030D-6E8A-4147-A177-3AD203B41FA5}">
-                      <a16:colId xmlns:a16="http://schemas.microsoft.com/office/drawing/2014/main" xmlns="" val="20000"/>
+                      <a16:colId xmlns="" xmlns:a16="http://schemas.microsoft.com/office/drawing/2014/main" val="20000"/>
                     </a:ext>
                   </a:extLst>
                 </a:gridCol>
@@ -7126,7 +7174,7 @@
                 </a:tc>
                 <a:extLst>
                   <a:ext uri="{0D108BD9-81ED-4DB2-BD59-A6C34878D82A}">
-                    <a16:rowId xmlns:a16="http://schemas.microsoft.com/office/drawing/2014/main" xmlns="" val="10000"/>
+                    <a16:rowId xmlns="" xmlns:a16="http://schemas.microsoft.com/office/drawing/2014/main" val="10000"/>
                   </a:ext>
                 </a:extLst>
               </a:tr>
@@ -7206,7 +7254,7 @@
                 </a:tc>
                 <a:extLst>
                   <a:ext uri="{0D108BD9-81ED-4DB2-BD59-A6C34878D82A}">
-                    <a16:rowId xmlns:a16="http://schemas.microsoft.com/office/drawing/2014/main" xmlns="" val="10001"/>
+                    <a16:rowId xmlns="" xmlns:a16="http://schemas.microsoft.com/office/drawing/2014/main" val="10001"/>
                   </a:ext>
                 </a:extLst>
               </a:tr>
@@ -7286,7 +7334,7 @@
                 </a:tc>
                 <a:extLst>
                   <a:ext uri="{0D108BD9-81ED-4DB2-BD59-A6C34878D82A}">
-                    <a16:rowId xmlns:a16="http://schemas.microsoft.com/office/drawing/2014/main" xmlns="" val="10002"/>
+                    <a16:rowId xmlns="" xmlns:a16="http://schemas.microsoft.com/office/drawing/2014/main" val="10002"/>
                   </a:ext>
                 </a:extLst>
               </a:tr>
@@ -7380,7 +7428,7 @@
                 </a:tc>
                 <a:extLst>
                   <a:ext uri="{0D108BD9-81ED-4DB2-BD59-A6C34878D82A}">
-                    <a16:rowId xmlns:a16="http://schemas.microsoft.com/office/drawing/2014/main" xmlns="" val="10003"/>
+                    <a16:rowId xmlns="" xmlns:a16="http://schemas.microsoft.com/office/drawing/2014/main" val="10003"/>
                   </a:ext>
                 </a:extLst>
               </a:tr>
@@ -7474,7 +7522,7 @@
                 </a:tc>
                 <a:extLst>
                   <a:ext uri="{0D108BD9-81ED-4DB2-BD59-A6C34878D82A}">
-                    <a16:rowId xmlns:a16="http://schemas.microsoft.com/office/drawing/2014/main" xmlns="" val="10004"/>
+                    <a16:rowId xmlns="" xmlns:a16="http://schemas.microsoft.com/office/drawing/2014/main" val="10004"/>
                   </a:ext>
                 </a:extLst>
               </a:tr>
@@ -7568,7 +7616,7 @@
                 </a:tc>
                 <a:extLst>
                   <a:ext uri="{0D108BD9-81ED-4DB2-BD59-A6C34878D82A}">
-                    <a16:rowId xmlns:a16="http://schemas.microsoft.com/office/drawing/2014/main" xmlns="" val="10005"/>
+                    <a16:rowId xmlns="" xmlns:a16="http://schemas.microsoft.com/office/drawing/2014/main" val="10005"/>
                   </a:ext>
                 </a:extLst>
               </a:tr>
@@ -7594,7 +7642,7 @@
                 <a:gridCol w="746280">
                   <a:extLst>
                     <a:ext uri="{9D8B030D-6E8A-4147-A177-3AD203B41FA5}">
-                      <a16:colId xmlns:a16="http://schemas.microsoft.com/office/drawing/2014/main" xmlns="" val="20000"/>
+                      <a16:colId xmlns="" xmlns:a16="http://schemas.microsoft.com/office/drawing/2014/main" val="20000"/>
                     </a:ext>
                   </a:extLst>
                 </a:gridCol>
@@ -7664,7 +7712,7 @@
                 </a:tc>
                 <a:extLst>
                   <a:ext uri="{0D108BD9-81ED-4DB2-BD59-A6C34878D82A}">
-                    <a16:rowId xmlns:a16="http://schemas.microsoft.com/office/drawing/2014/main" xmlns="" val="10000"/>
+                    <a16:rowId xmlns="" xmlns:a16="http://schemas.microsoft.com/office/drawing/2014/main" val="10000"/>
                   </a:ext>
                 </a:extLst>
               </a:tr>
@@ -7733,7 +7781,7 @@
                 </a:tc>
                 <a:extLst>
                   <a:ext uri="{0D108BD9-81ED-4DB2-BD59-A6C34878D82A}">
-                    <a16:rowId xmlns:a16="http://schemas.microsoft.com/office/drawing/2014/main" xmlns="" val="10001"/>
+                    <a16:rowId xmlns="" xmlns:a16="http://schemas.microsoft.com/office/drawing/2014/main" val="10001"/>
                   </a:ext>
                 </a:extLst>
               </a:tr>
@@ -7804,7 +7852,7 @@
                 </a:tc>
                 <a:extLst>
                   <a:ext uri="{0D108BD9-81ED-4DB2-BD59-A6C34878D82A}">
-                    <a16:rowId xmlns:a16="http://schemas.microsoft.com/office/drawing/2014/main" xmlns="" val="10002"/>
+                    <a16:rowId xmlns="" xmlns:a16="http://schemas.microsoft.com/office/drawing/2014/main" val="10002"/>
                   </a:ext>
                 </a:extLst>
               </a:tr>
@@ -7901,7 +7949,7 @@
                 </a:tc>
                 <a:extLst>
                   <a:ext uri="{0D108BD9-81ED-4DB2-BD59-A6C34878D82A}">
-                    <a16:rowId xmlns:a16="http://schemas.microsoft.com/office/drawing/2014/main" xmlns="" val="10003"/>
+                    <a16:rowId xmlns="" xmlns:a16="http://schemas.microsoft.com/office/drawing/2014/main" val="10003"/>
                   </a:ext>
                 </a:extLst>
               </a:tr>
@@ -7970,7 +8018,7 @@
                 </a:tc>
                 <a:extLst>
                   <a:ext uri="{0D108BD9-81ED-4DB2-BD59-A6C34878D82A}">
-                    <a16:rowId xmlns:a16="http://schemas.microsoft.com/office/drawing/2014/main" xmlns="" val="10004"/>
+                    <a16:rowId xmlns="" xmlns:a16="http://schemas.microsoft.com/office/drawing/2014/main" val="10004"/>
                   </a:ext>
                 </a:extLst>
               </a:tr>
@@ -8039,7 +8087,7 @@
                 </a:tc>
                 <a:extLst>
                   <a:ext uri="{0D108BD9-81ED-4DB2-BD59-A6C34878D82A}">
-                    <a16:rowId xmlns:a16="http://schemas.microsoft.com/office/drawing/2014/main" xmlns="" val="10005"/>
+                    <a16:rowId xmlns="" xmlns:a16="http://schemas.microsoft.com/office/drawing/2014/main" val="10005"/>
                   </a:ext>
                 </a:extLst>
               </a:tr>

</xml_diff>

<commit_message>
Correção da imagem, colocando as setas
</commit_message>
<xml_diff>
--- a/TopologicalSort/Seminario Topological Sort.pptx
+++ b/TopologicalSort/Seminario Topological Sort.pptx
@@ -4681,7 +4681,7 @@
               <a:t>HornlessMoose</a:t>
             </a:r>
             <a:r>
-              <a:rPr lang="pt-BR" sz="3400" b="1" strike="noStrike" spc="-1" smtClean="0">
+              <a:rPr lang="pt-BR" sz="3400" b="1" strike="noStrike" spc="-1" dirty="0" smtClean="0">
                 <a:solidFill>
                   <a:srgbClr val="000000"/>
                 </a:solidFill>
@@ -4694,7 +4694,23 @@
                 <a:ea typeface="Arial Narrow"/>
                 <a:hlinkClick r:id="rId2"/>
               </a:rPr>
-              <a:t>/Huffman</a:t>
+              <a:t>/</a:t>
+            </a:r>
+            <a:r>
+              <a:rPr lang="pt-BR" sz="3400" b="1" strike="noStrike" spc="-1" dirty="0" err="1" smtClean="0">
+                <a:solidFill>
+                  <a:srgbClr val="000000"/>
+                </a:solidFill>
+                <a:uFill>
+                  <a:solidFill>
+                    <a:srgbClr val="FFFFFF"/>
+                  </a:solidFill>
+                </a:uFill>
+                <a:latin typeface="Arial Narrow"/>
+                <a:ea typeface="Arial Narrow"/>
+                <a:hlinkClick r:id="rId2"/>
+              </a:rPr>
+              <a:t>Huffman</a:t>
             </a:r>
             <a:r>
               <a:rPr lang="pt-BR" sz="3400" b="1" strike="noStrike" spc="-1" dirty="0">
@@ -6525,7 +6541,7 @@
           <p:cNvPr id="2" name="Imagem 2">
             <a:extLst>
               <a:ext uri="{FF2B5EF4-FFF2-40B4-BE49-F238E27FC236}">
-                <a16:creationId xmlns="" xmlns:a16="http://schemas.microsoft.com/office/drawing/2014/main" id="{A4597B11-2E36-439A-AAF8-554458330300}"/>
+                <a16:creationId xmlns:a16="http://schemas.microsoft.com/office/drawing/2014/main" xmlns="" id="{A4597B11-2E36-439A-AAF8-554458330300}"/>
               </a:ext>
             </a:extLst>
           </p:cNvPr>
@@ -7093,7 +7109,7 @@
                 <a:gridCol w="5075640">
                   <a:extLst>
                     <a:ext uri="{9D8B030D-6E8A-4147-A177-3AD203B41FA5}">
-                      <a16:colId xmlns="" xmlns:a16="http://schemas.microsoft.com/office/drawing/2014/main" val="20000"/>
+                      <a16:colId xmlns:a16="http://schemas.microsoft.com/office/drawing/2014/main" xmlns="" val="20000"/>
                     </a:ext>
                   </a:extLst>
                 </a:gridCol>
@@ -7174,7 +7190,7 @@
                 </a:tc>
                 <a:extLst>
                   <a:ext uri="{0D108BD9-81ED-4DB2-BD59-A6C34878D82A}">
-                    <a16:rowId xmlns="" xmlns:a16="http://schemas.microsoft.com/office/drawing/2014/main" val="10000"/>
+                    <a16:rowId xmlns:a16="http://schemas.microsoft.com/office/drawing/2014/main" xmlns="" val="10000"/>
                   </a:ext>
                 </a:extLst>
               </a:tr>
@@ -7254,7 +7270,7 @@
                 </a:tc>
                 <a:extLst>
                   <a:ext uri="{0D108BD9-81ED-4DB2-BD59-A6C34878D82A}">
-                    <a16:rowId xmlns="" xmlns:a16="http://schemas.microsoft.com/office/drawing/2014/main" val="10001"/>
+                    <a16:rowId xmlns:a16="http://schemas.microsoft.com/office/drawing/2014/main" xmlns="" val="10001"/>
                   </a:ext>
                 </a:extLst>
               </a:tr>
@@ -7334,7 +7350,7 @@
                 </a:tc>
                 <a:extLst>
                   <a:ext uri="{0D108BD9-81ED-4DB2-BD59-A6C34878D82A}">
-                    <a16:rowId xmlns="" xmlns:a16="http://schemas.microsoft.com/office/drawing/2014/main" val="10002"/>
+                    <a16:rowId xmlns:a16="http://schemas.microsoft.com/office/drawing/2014/main" xmlns="" val="10002"/>
                   </a:ext>
                 </a:extLst>
               </a:tr>
@@ -7428,7 +7444,7 @@
                 </a:tc>
                 <a:extLst>
                   <a:ext uri="{0D108BD9-81ED-4DB2-BD59-A6C34878D82A}">
-                    <a16:rowId xmlns="" xmlns:a16="http://schemas.microsoft.com/office/drawing/2014/main" val="10003"/>
+                    <a16:rowId xmlns:a16="http://schemas.microsoft.com/office/drawing/2014/main" xmlns="" val="10003"/>
                   </a:ext>
                 </a:extLst>
               </a:tr>
@@ -7522,7 +7538,7 @@
                 </a:tc>
                 <a:extLst>
                   <a:ext uri="{0D108BD9-81ED-4DB2-BD59-A6C34878D82A}">
-                    <a16:rowId xmlns="" xmlns:a16="http://schemas.microsoft.com/office/drawing/2014/main" val="10004"/>
+                    <a16:rowId xmlns:a16="http://schemas.microsoft.com/office/drawing/2014/main" xmlns="" val="10004"/>
                   </a:ext>
                 </a:extLst>
               </a:tr>
@@ -7616,7 +7632,7 @@
                 </a:tc>
                 <a:extLst>
                   <a:ext uri="{0D108BD9-81ED-4DB2-BD59-A6C34878D82A}">
-                    <a16:rowId xmlns="" xmlns:a16="http://schemas.microsoft.com/office/drawing/2014/main" val="10005"/>
+                    <a16:rowId xmlns:a16="http://schemas.microsoft.com/office/drawing/2014/main" xmlns="" val="10005"/>
                   </a:ext>
                 </a:extLst>
               </a:tr>
@@ -7642,7 +7658,7 @@
                 <a:gridCol w="746280">
                   <a:extLst>
                     <a:ext uri="{9D8B030D-6E8A-4147-A177-3AD203B41FA5}">
-                      <a16:colId xmlns="" xmlns:a16="http://schemas.microsoft.com/office/drawing/2014/main" val="20000"/>
+                      <a16:colId xmlns:a16="http://schemas.microsoft.com/office/drawing/2014/main" xmlns="" val="20000"/>
                     </a:ext>
                   </a:extLst>
                 </a:gridCol>
@@ -7712,7 +7728,7 @@
                 </a:tc>
                 <a:extLst>
                   <a:ext uri="{0D108BD9-81ED-4DB2-BD59-A6C34878D82A}">
-                    <a16:rowId xmlns="" xmlns:a16="http://schemas.microsoft.com/office/drawing/2014/main" val="10000"/>
+                    <a16:rowId xmlns:a16="http://schemas.microsoft.com/office/drawing/2014/main" xmlns="" val="10000"/>
                   </a:ext>
                 </a:extLst>
               </a:tr>
@@ -7781,7 +7797,7 @@
                 </a:tc>
                 <a:extLst>
                   <a:ext uri="{0D108BD9-81ED-4DB2-BD59-A6C34878D82A}">
-                    <a16:rowId xmlns="" xmlns:a16="http://schemas.microsoft.com/office/drawing/2014/main" val="10001"/>
+                    <a16:rowId xmlns:a16="http://schemas.microsoft.com/office/drawing/2014/main" xmlns="" val="10001"/>
                   </a:ext>
                 </a:extLst>
               </a:tr>
@@ -7852,7 +7868,7 @@
                 </a:tc>
                 <a:extLst>
                   <a:ext uri="{0D108BD9-81ED-4DB2-BD59-A6C34878D82A}">
-                    <a16:rowId xmlns="" xmlns:a16="http://schemas.microsoft.com/office/drawing/2014/main" val="10002"/>
+                    <a16:rowId xmlns:a16="http://schemas.microsoft.com/office/drawing/2014/main" xmlns="" val="10002"/>
                   </a:ext>
                 </a:extLst>
               </a:tr>
@@ -7949,7 +7965,7 @@
                 </a:tc>
                 <a:extLst>
                   <a:ext uri="{0D108BD9-81ED-4DB2-BD59-A6C34878D82A}">
-                    <a16:rowId xmlns="" xmlns:a16="http://schemas.microsoft.com/office/drawing/2014/main" val="10003"/>
+                    <a16:rowId xmlns:a16="http://schemas.microsoft.com/office/drawing/2014/main" xmlns="" val="10003"/>
                   </a:ext>
                 </a:extLst>
               </a:tr>
@@ -8018,7 +8034,7 @@
                 </a:tc>
                 <a:extLst>
                   <a:ext uri="{0D108BD9-81ED-4DB2-BD59-A6C34878D82A}">
-                    <a16:rowId xmlns="" xmlns:a16="http://schemas.microsoft.com/office/drawing/2014/main" val="10004"/>
+                    <a16:rowId xmlns:a16="http://schemas.microsoft.com/office/drawing/2014/main" xmlns="" val="10004"/>
                   </a:ext>
                 </a:extLst>
               </a:tr>
@@ -8087,7 +8103,7 @@
                 </a:tc>
                 <a:extLst>
                   <a:ext uri="{0D108BD9-81ED-4DB2-BD59-A6C34878D82A}">
-                    <a16:rowId xmlns="" xmlns:a16="http://schemas.microsoft.com/office/drawing/2014/main" val="10005"/>
+                    <a16:rowId xmlns:a16="http://schemas.microsoft.com/office/drawing/2014/main" xmlns="" val="10005"/>
                   </a:ext>
                 </a:extLst>
               </a:tr>
@@ -8320,7 +8336,67 @@
                 <a:latin typeface="Arial"/>
                 <a:ea typeface="Calibri"/>
               </a:rPr>
-              <a:t> disciplinas desse curso possui como pré-requisito outra disciplina.</a:t>
+              <a:t> disciplinas desse curso possui </a:t>
+            </a:r>
+            <a:r>
+              <a:rPr lang="pt-BR" sz="3600" b="0" strike="noStrike" spc="-1" dirty="0" smtClean="0">
+                <a:solidFill>
+                  <a:srgbClr val="000000"/>
+                </a:solidFill>
+                <a:uFill>
+                  <a:solidFill>
+                    <a:srgbClr val="FFFFFF"/>
+                  </a:solidFill>
+                </a:uFill>
+                <a:latin typeface="Arial"/>
+                <a:ea typeface="Calibri"/>
+              </a:rPr>
+              <a:t>como </a:t>
+            </a:r>
+            <a:r>
+              <a:rPr lang="pt-BR" sz="3600" b="0" strike="noStrike" spc="-1" dirty="0">
+                <a:solidFill>
+                  <a:srgbClr val="000000"/>
+                </a:solidFill>
+                <a:uFill>
+                  <a:solidFill>
+                    <a:srgbClr val="FFFFFF"/>
+                  </a:solidFill>
+                </a:uFill>
+                <a:latin typeface="Arial"/>
+                <a:ea typeface="Calibri"/>
+              </a:rPr>
+              <a:t>pré-requisito outra </a:t>
+            </a:r>
+            <a:r>
+              <a:rPr lang="pt-BR" sz="3600" b="0" strike="noStrike" spc="-1" dirty="0" smtClean="0">
+                <a:solidFill>
+                  <a:srgbClr val="000000"/>
+                </a:solidFill>
+                <a:uFill>
+                  <a:solidFill>
+                    <a:srgbClr val="FFFFFF"/>
+                  </a:solidFill>
+                </a:uFill>
+                <a:latin typeface="Arial"/>
+                <a:ea typeface="Calibri"/>
+              </a:rPr>
+              <a:t>disciplina</a:t>
+            </a:r>
+            <a:r>
+              <a:rPr lang="pt-BR" sz="3600" b="0" strike="noStrike" spc="-1" dirty="0">
+                <a:solidFill>
+                  <a:srgbClr val="000000"/>
+                </a:solidFill>
+                <a:uFill>
+                  <a:solidFill>
+                    <a:srgbClr val="FFFFFF"/>
+                  </a:solidFill>
+                </a:uFill>
+                <a:latin typeface="Arial"/>
+                <a:ea typeface="Calibri"/>
+              </a:rPr>
+              <a:t>.</a:t>
             </a:r>
             <a:endParaRPr lang="pt-BR" sz="1800" b="0" strike="noStrike" spc="-1" dirty="0">
               <a:solidFill>
@@ -8357,7 +8433,7 @@
               </a:buClr>
               <a:buSzPct val="75000"/>
             </a:pPr>
-            <a:endParaRPr lang="pt-BR" sz="1800" b="0" strike="noStrike" spc="-1">
+            <a:endParaRPr lang="pt-BR" sz="1800" b="0" strike="noStrike" spc="-1" dirty="0">
               <a:solidFill>
                 <a:srgbClr val="000000"/>
               </a:solidFill>
@@ -8372,7 +8448,7 @@
               </a:buClr>
               <a:buSzPct val="75000"/>
             </a:pPr>
-            <a:endParaRPr lang="pt-BR" sz="1800" b="0" strike="noStrike" spc="-1">
+            <a:endParaRPr lang="pt-BR" sz="1800" b="0" strike="noStrike" spc="-1" dirty="0">
               <a:solidFill>
                 <a:srgbClr val="000000"/>
               </a:solidFill>
@@ -8387,7 +8463,7 @@
               </a:buClr>
               <a:buSzPct val="75000"/>
             </a:pPr>
-            <a:endParaRPr lang="pt-BR" sz="1800" b="0" strike="noStrike" spc="-1">
+            <a:endParaRPr lang="pt-BR" sz="1800" b="0" strike="noStrike" spc="-1" dirty="0">
               <a:solidFill>
                 <a:srgbClr val="000000"/>
               </a:solidFill>
@@ -8402,7 +8478,7 @@
               </a:buClr>
               <a:buSzPct val="75000"/>
             </a:pPr>
-            <a:endParaRPr lang="pt-BR" sz="1800" b="0" strike="noStrike" spc="-1">
+            <a:endParaRPr lang="pt-BR" sz="1800" b="0" strike="noStrike" spc="-1" dirty="0">
               <a:solidFill>
                 <a:srgbClr val="000000"/>
               </a:solidFill>
@@ -8417,7 +8493,7 @@
               </a:buClr>
               <a:buSzPct val="75000"/>
             </a:pPr>
-            <a:endParaRPr lang="pt-BR" sz="1800" b="0" strike="noStrike" spc="-1">
+            <a:endParaRPr lang="pt-BR" sz="1800" b="0" strike="noStrike" spc="-1" dirty="0">
               <a:solidFill>
                 <a:srgbClr val="000000"/>
               </a:solidFill>
@@ -8432,7 +8508,7 @@
               </a:buClr>
               <a:buSzPct val="75000"/>
             </a:pPr>
-            <a:endParaRPr lang="pt-BR" sz="1800" b="0" strike="noStrike" spc="-1">
+            <a:endParaRPr lang="pt-BR" sz="1800" b="0" strike="noStrike" spc="-1" dirty="0">
               <a:solidFill>
                 <a:srgbClr val="000000"/>
               </a:solidFill>
@@ -8447,7 +8523,7 @@
               </a:buClr>
               <a:buSzPct val="75000"/>
             </a:pPr>
-            <a:endParaRPr lang="pt-BR" sz="1800" b="0" strike="noStrike" spc="-1">
+            <a:endParaRPr lang="pt-BR" sz="1800" b="0" strike="noStrike" spc="-1" dirty="0">
               <a:solidFill>
                 <a:srgbClr val="000000"/>
               </a:solidFill>
@@ -8606,25 +8682,32 @@
       </p:sp>
       <p:pic>
         <p:nvPicPr>
-          <p:cNvPr id="82" name="Imagem 81"/>
-          <p:cNvPicPr/>
+          <p:cNvPr id="4" name="Imagem 3"/>
+          <p:cNvPicPr>
+            <a:picLocks noChangeAspect="1"/>
+          </p:cNvPicPr>
           <p:nvPr/>
         </p:nvPicPr>
         <p:blipFill>
-          <a:blip r:embed="rId2"/>
-          <a:stretch/>
+          <a:blip r:embed="rId2">
+            <a:extLst>
+              <a:ext uri="{28A0092B-C50C-407E-A947-70E740481C1C}">
+                <a14:useLocalDpi xmlns:a14="http://schemas.microsoft.com/office/drawing/2010/main" val="0"/>
+              </a:ext>
+            </a:extLst>
+          </a:blip>
+          <a:stretch>
+            <a:fillRect/>
+          </a:stretch>
         </p:blipFill>
         <p:spPr>
-          <a:xfrm rot="26400">
-            <a:off x="3085920" y="3285360"/>
-            <a:ext cx="5765760" cy="4323960"/>
+          <a:xfrm>
+            <a:off x="2997200" y="3467100"/>
+            <a:ext cx="5772956" cy="4420217"/>
           </a:xfrm>
           <a:prstGeom prst="rect">
             <a:avLst/>
           </a:prstGeom>
-          <a:ln>
-            <a:noFill/>
-          </a:ln>
         </p:spPr>
       </p:pic>
     </p:spTree>

</xml_diff>